<commit_message>
Updated Poster and LE Notes
</commit_message>
<xml_diff>
--- a/POSTER Super conductors and their applications.pptx
+++ b/POSTER Super conductors and their applications.pptx
@@ -104,6 +104,22 @@
       </a:defRPr>
     </a:lvl9pPr>
   </p:defaultTextStyle>
+  <p:extLst>
+    <p:ext uri="{EFAFB233-063F-42B5-8137-9DF3F51BA10A}">
+      <p15:sldGuideLst xmlns:p15="http://schemas.microsoft.com/office/powerpoint/2012/main">
+        <p15:guide id="1" orient="horz" pos="2160">
+          <p15:clr>
+            <a:srgbClr val="A4A3A4"/>
+          </p15:clr>
+        </p15:guide>
+        <p15:guide id="2" pos="2880">
+          <p15:clr>
+            <a:srgbClr val="A4A3A4"/>
+          </p15:clr>
+        </p15:guide>
+      </p15:sldGuideLst>
+    </p:ext>
+  </p:extLst>
 </p:presentation>
 </file>
 
@@ -289,7 +305,7 @@
             <a:fld id="{61CFA306-51E4-4C6F-A48D-80D17BC5C590}" type="datetimeFigureOut">
               <a:rPr lang="en-GB" smtClean="0"/>
               <a:pPr/>
-              <a:t>24/10/2015</a:t>
+              <a:t>26/10/2015</a:t>
             </a:fld>
             <a:endParaRPr lang="en-GB"/>
           </a:p>
@@ -341,7 +357,7 @@
     </p:spTree>
     <p:extLst>
       <p:ext uri="{BB962C8B-B14F-4D97-AF65-F5344CB8AC3E}">
-        <p14:creationId xmlns:p14="http://schemas.microsoft.com/office/powerpoint/2010/main" xmlns="" val="458495677"/>
+        <p14:creationId xmlns:p14="http://schemas.microsoft.com/office/powerpoint/2010/main" val="458495677"/>
       </p:ext>
     </p:extLst>
   </p:cSld>
@@ -461,7 +477,7 @@
             <a:fld id="{61CFA306-51E4-4C6F-A48D-80D17BC5C590}" type="datetimeFigureOut">
               <a:rPr lang="en-GB" smtClean="0"/>
               <a:pPr/>
-              <a:t>24/10/2015</a:t>
+              <a:t>26/10/2015</a:t>
             </a:fld>
             <a:endParaRPr lang="en-GB"/>
           </a:p>
@@ -513,7 +529,7 @@
     </p:spTree>
     <p:extLst>
       <p:ext uri="{BB962C8B-B14F-4D97-AF65-F5344CB8AC3E}">
-        <p14:creationId xmlns:p14="http://schemas.microsoft.com/office/powerpoint/2010/main" xmlns="" val="2686291323"/>
+        <p14:creationId xmlns:p14="http://schemas.microsoft.com/office/powerpoint/2010/main" val="2686291323"/>
       </p:ext>
     </p:extLst>
   </p:cSld>
@@ -643,7 +659,7 @@
             <a:fld id="{61CFA306-51E4-4C6F-A48D-80D17BC5C590}" type="datetimeFigureOut">
               <a:rPr lang="en-GB" smtClean="0"/>
               <a:pPr/>
-              <a:t>24/10/2015</a:t>
+              <a:t>26/10/2015</a:t>
             </a:fld>
             <a:endParaRPr lang="en-GB"/>
           </a:p>
@@ -695,7 +711,7 @@
     </p:spTree>
     <p:extLst>
       <p:ext uri="{BB962C8B-B14F-4D97-AF65-F5344CB8AC3E}">
-        <p14:creationId xmlns:p14="http://schemas.microsoft.com/office/powerpoint/2010/main" xmlns="" val="770615379"/>
+        <p14:creationId xmlns:p14="http://schemas.microsoft.com/office/powerpoint/2010/main" val="770615379"/>
       </p:ext>
     </p:extLst>
   </p:cSld>
@@ -815,7 +831,7 @@
             <a:fld id="{61CFA306-51E4-4C6F-A48D-80D17BC5C590}" type="datetimeFigureOut">
               <a:rPr lang="en-GB" smtClean="0"/>
               <a:pPr/>
-              <a:t>24/10/2015</a:t>
+              <a:t>26/10/2015</a:t>
             </a:fld>
             <a:endParaRPr lang="en-GB"/>
           </a:p>
@@ -867,7 +883,7 @@
     </p:spTree>
     <p:extLst>
       <p:ext uri="{BB962C8B-B14F-4D97-AF65-F5344CB8AC3E}">
-        <p14:creationId xmlns:p14="http://schemas.microsoft.com/office/powerpoint/2010/main" xmlns="" val="1971839996"/>
+        <p14:creationId xmlns:p14="http://schemas.microsoft.com/office/powerpoint/2010/main" val="1971839996"/>
       </p:ext>
     </p:extLst>
   </p:cSld>
@@ -1063,7 +1079,7 @@
             <a:fld id="{61CFA306-51E4-4C6F-A48D-80D17BC5C590}" type="datetimeFigureOut">
               <a:rPr lang="en-GB" smtClean="0"/>
               <a:pPr/>
-              <a:t>24/10/2015</a:t>
+              <a:t>26/10/2015</a:t>
             </a:fld>
             <a:endParaRPr lang="en-GB"/>
           </a:p>
@@ -1115,7 +1131,7 @@
     </p:spTree>
     <p:extLst>
       <p:ext uri="{BB962C8B-B14F-4D97-AF65-F5344CB8AC3E}">
-        <p14:creationId xmlns:p14="http://schemas.microsoft.com/office/powerpoint/2010/main" xmlns="" val="9316424"/>
+        <p14:creationId xmlns:p14="http://schemas.microsoft.com/office/powerpoint/2010/main" val="9316424"/>
       </p:ext>
     </p:extLst>
   </p:cSld>
@@ -1353,7 +1369,7 @@
             <a:fld id="{61CFA306-51E4-4C6F-A48D-80D17BC5C590}" type="datetimeFigureOut">
               <a:rPr lang="en-GB" smtClean="0"/>
               <a:pPr/>
-              <a:t>24/10/2015</a:t>
+              <a:t>26/10/2015</a:t>
             </a:fld>
             <a:endParaRPr lang="en-GB"/>
           </a:p>
@@ -1405,7 +1421,7 @@
     </p:spTree>
     <p:extLst>
       <p:ext uri="{BB962C8B-B14F-4D97-AF65-F5344CB8AC3E}">
-        <p14:creationId xmlns:p14="http://schemas.microsoft.com/office/powerpoint/2010/main" xmlns="" val="584304185"/>
+        <p14:creationId xmlns:p14="http://schemas.microsoft.com/office/powerpoint/2010/main" val="584304185"/>
       </p:ext>
     </p:extLst>
   </p:cSld>
@@ -1777,7 +1793,7 @@
             <a:fld id="{61CFA306-51E4-4C6F-A48D-80D17BC5C590}" type="datetimeFigureOut">
               <a:rPr lang="en-GB" smtClean="0"/>
               <a:pPr/>
-              <a:t>24/10/2015</a:t>
+              <a:t>26/10/2015</a:t>
             </a:fld>
             <a:endParaRPr lang="en-GB"/>
           </a:p>
@@ -1829,7 +1845,7 @@
     </p:spTree>
     <p:extLst>
       <p:ext uri="{BB962C8B-B14F-4D97-AF65-F5344CB8AC3E}">
-        <p14:creationId xmlns:p14="http://schemas.microsoft.com/office/powerpoint/2010/main" xmlns="" val="2683001785"/>
+        <p14:creationId xmlns:p14="http://schemas.microsoft.com/office/powerpoint/2010/main" val="2683001785"/>
       </p:ext>
     </p:extLst>
   </p:cSld>
@@ -1897,7 +1913,7 @@
             <a:fld id="{61CFA306-51E4-4C6F-A48D-80D17BC5C590}" type="datetimeFigureOut">
               <a:rPr lang="en-GB" smtClean="0"/>
               <a:pPr/>
-              <a:t>24/10/2015</a:t>
+              <a:t>26/10/2015</a:t>
             </a:fld>
             <a:endParaRPr lang="en-GB"/>
           </a:p>
@@ -1949,7 +1965,7 @@
     </p:spTree>
     <p:extLst>
       <p:ext uri="{BB962C8B-B14F-4D97-AF65-F5344CB8AC3E}">
-        <p14:creationId xmlns:p14="http://schemas.microsoft.com/office/powerpoint/2010/main" xmlns="" val="2200197108"/>
+        <p14:creationId xmlns:p14="http://schemas.microsoft.com/office/powerpoint/2010/main" val="2200197108"/>
       </p:ext>
     </p:extLst>
   </p:cSld>
@@ -1994,7 +2010,7 @@
             <a:fld id="{61CFA306-51E4-4C6F-A48D-80D17BC5C590}" type="datetimeFigureOut">
               <a:rPr lang="en-GB" smtClean="0"/>
               <a:pPr/>
-              <a:t>24/10/2015</a:t>
+              <a:t>26/10/2015</a:t>
             </a:fld>
             <a:endParaRPr lang="en-GB"/>
           </a:p>
@@ -2046,7 +2062,7 @@
     </p:spTree>
     <p:extLst>
       <p:ext uri="{BB962C8B-B14F-4D97-AF65-F5344CB8AC3E}">
-        <p14:creationId xmlns:p14="http://schemas.microsoft.com/office/powerpoint/2010/main" xmlns="" val="1874254634"/>
+        <p14:creationId xmlns:p14="http://schemas.microsoft.com/office/powerpoint/2010/main" val="1874254634"/>
       </p:ext>
     </p:extLst>
   </p:cSld>
@@ -2273,7 +2289,7 @@
             <a:fld id="{61CFA306-51E4-4C6F-A48D-80D17BC5C590}" type="datetimeFigureOut">
               <a:rPr lang="en-GB" smtClean="0"/>
               <a:pPr/>
-              <a:t>24/10/2015</a:t>
+              <a:t>26/10/2015</a:t>
             </a:fld>
             <a:endParaRPr lang="en-GB"/>
           </a:p>
@@ -2325,7 +2341,7 @@
     </p:spTree>
     <p:extLst>
       <p:ext uri="{BB962C8B-B14F-4D97-AF65-F5344CB8AC3E}">
-        <p14:creationId xmlns:p14="http://schemas.microsoft.com/office/powerpoint/2010/main" xmlns="" val="3759242600"/>
+        <p14:creationId xmlns:p14="http://schemas.microsoft.com/office/powerpoint/2010/main" val="3759242600"/>
       </p:ext>
     </p:extLst>
   </p:cSld>
@@ -2528,7 +2544,7 @@
             <a:fld id="{61CFA306-51E4-4C6F-A48D-80D17BC5C590}" type="datetimeFigureOut">
               <a:rPr lang="en-GB" smtClean="0"/>
               <a:pPr/>
-              <a:t>24/10/2015</a:t>
+              <a:t>26/10/2015</a:t>
             </a:fld>
             <a:endParaRPr lang="en-GB"/>
           </a:p>
@@ -2580,7 +2596,7 @@
     </p:spTree>
     <p:extLst>
       <p:ext uri="{BB962C8B-B14F-4D97-AF65-F5344CB8AC3E}">
-        <p14:creationId xmlns:p14="http://schemas.microsoft.com/office/powerpoint/2010/main" xmlns="" val="3579747736"/>
+        <p14:creationId xmlns:p14="http://schemas.microsoft.com/office/powerpoint/2010/main" val="3579747736"/>
       </p:ext>
     </p:extLst>
   </p:cSld>
@@ -2743,7 +2759,7 @@
             <a:fld id="{61CFA306-51E4-4C6F-A48D-80D17BC5C590}" type="datetimeFigureOut">
               <a:rPr lang="en-GB" smtClean="0"/>
               <a:pPr/>
-              <a:t>24/10/2015</a:t>
+              <a:t>26/10/2015</a:t>
             </a:fld>
             <a:endParaRPr lang="en-GB"/>
           </a:p>
@@ -2831,7 +2847,7 @@
     </p:spTree>
     <p:extLst>
       <p:ext uri="{BB962C8B-B14F-4D97-AF65-F5344CB8AC3E}">
-        <p14:creationId xmlns:p14="http://schemas.microsoft.com/office/powerpoint/2010/main" xmlns="" val="1714631669"/>
+        <p14:creationId xmlns:p14="http://schemas.microsoft.com/office/powerpoint/2010/main" val="1714631669"/>
       </p:ext>
     </p:extLst>
   </p:cSld>
@@ -3131,7 +3147,7 @@
         </p:nvSpPr>
         <p:spPr>
           <a:xfrm>
-            <a:off x="0" y="-26278"/>
+            <a:off x="0" y="32572"/>
             <a:ext cx="4176464" cy="864096"/>
           </a:xfrm>
         </p:spPr>
@@ -3143,7 +3159,11 @@
           <a:p>
             <a:r>
               <a:rPr lang="en-GB" sz="3600" dirty="0" smtClean="0"/>
-              <a:t>Super conductors and their applications </a:t>
+              <a:t>Superconductors </a:t>
+            </a:r>
+            <a:r>
+              <a:rPr lang="en-GB" sz="3600" dirty="0" smtClean="0"/>
+              <a:t>and their applications </a:t>
             </a:r>
             <a:endParaRPr lang="en-GB" sz="3600" dirty="0"/>
           </a:p>
@@ -3187,8 +3207,8 @@
         </p:nvSpPr>
         <p:spPr>
           <a:xfrm>
-            <a:off x="0" y="4149080"/>
-            <a:ext cx="2952328" cy="369332"/>
+            <a:off x="35496" y="3289595"/>
+            <a:ext cx="2952328" cy="646331"/>
           </a:xfrm>
           <a:prstGeom prst="rect">
             <a:avLst/>
@@ -3203,8 +3223,14 @@
           <a:p>
             <a:r>
               <a:rPr lang="en-GB" dirty="0" smtClean="0"/>
-              <a:t>London equations</a:t>
-            </a:r>
+              <a:t>London </a:t>
+            </a:r>
+            <a:r>
+              <a:rPr lang="en-GB" dirty="0" smtClean="0"/>
+              <a:t>equations:</a:t>
+            </a:r>
+          </a:p>
+          <a:p>
             <a:endParaRPr lang="en-GB" dirty="0"/>
           </a:p>
         </p:txBody>
@@ -3217,8 +3243,8 @@
         </p:nvSpPr>
         <p:spPr>
           <a:xfrm>
-            <a:off x="0" y="1253758"/>
-            <a:ext cx="3168352" cy="1754326"/>
+            <a:off x="48872" y="1287957"/>
+            <a:ext cx="3851920" cy="1754326"/>
           </a:xfrm>
           <a:prstGeom prst="rect">
             <a:avLst/>
@@ -3233,7 +3259,7 @@
           <a:p>
             <a:r>
               <a:rPr lang="en-GB" dirty="0" smtClean="0"/>
-              <a:t>Super conductor </a:t>
+              <a:t>Superconductor </a:t>
             </a:r>
             <a:r>
               <a:rPr lang="en-GB" dirty="0" smtClean="0"/>
@@ -3242,30 +3268,27 @@
           </a:p>
           <a:p>
             <a:r>
-              <a:rPr lang="en-GB" dirty="0" err="1" smtClean="0"/>
-              <a:t>Deffinition</a:t>
-            </a:r>
-            <a:r>
               <a:rPr lang="en-GB" dirty="0" smtClean="0"/>
-              <a:t> </a:t>
-            </a:r>
-          </a:p>
-          <a:p>
-            <a:r>
-              <a:rPr lang="en-GB" dirty="0" err="1" smtClean="0"/>
-              <a:t>Propperties</a:t>
-            </a:r>
+              <a:t>Definition </a:t>
+            </a:r>
+            <a:endParaRPr lang="en-GB" dirty="0" smtClean="0"/>
+          </a:p>
+          <a:p>
             <a:r>
               <a:rPr lang="en-GB" dirty="0" smtClean="0"/>
-              <a:t> e.g. R=0,  </a:t>
-            </a:r>
-            <a:r>
-              <a:rPr lang="en-GB" dirty="0" err="1" smtClean="0"/>
-              <a:t>mag</a:t>
+              <a:t>Properties </a:t>
             </a:r>
             <a:r>
               <a:rPr lang="en-GB" dirty="0" smtClean="0"/>
-              <a:t> field expelled </a:t>
+              <a:t>e.g. R=0,  </a:t>
+            </a:r>
+            <a:r>
+              <a:rPr lang="en-GB" dirty="0" smtClean="0"/>
+              <a:t>magnetic </a:t>
+            </a:r>
+            <a:r>
+              <a:rPr lang="en-GB" dirty="0" smtClean="0"/>
+              <a:t>field expelled </a:t>
             </a:r>
           </a:p>
           <a:p>
@@ -3391,7 +3414,7 @@
             <a:blip r:embed="rId2" cstate="print">
               <a:extLst>
                 <a:ext uri="{28A0092B-C50C-407E-A947-70E740481C1C}">
-                  <a14:useLocalDpi xmlns:a14="http://schemas.microsoft.com/office/drawing/2010/main" xmlns="" val="0"/>
+                  <a14:useLocalDpi xmlns:a14="http://schemas.microsoft.com/office/drawing/2010/main" val="0"/>
                 </a:ext>
               </a:extLst>
             </a:blip>
@@ -3413,14 +3436,14 @@
             <a:effectLst/>
             <a:extLst>
               <a:ext uri="{909E8E84-426E-40DD-AFC4-6F175D3DCCD1}">
-                <a14:hiddenFill xmlns:a14="http://schemas.microsoft.com/office/drawing/2010/main" xmlns="">
+                <a14:hiddenFill xmlns:a14="http://schemas.microsoft.com/office/drawing/2010/main">
                   <a:solidFill>
                     <a:schemeClr val="accent1"/>
                   </a:solidFill>
                 </a14:hiddenFill>
               </a:ext>
               <a:ext uri="{91240B29-F687-4F45-9708-019B960494DF}">
-                <a14:hiddenLine xmlns:a14="http://schemas.microsoft.com/office/drawing/2010/main" xmlns="" w="9525">
+                <a14:hiddenLine xmlns:a14="http://schemas.microsoft.com/office/drawing/2010/main" w="9525">
                   <a:solidFill>
                     <a:schemeClr val="tx1"/>
                   </a:solidFill>
@@ -3430,7 +3453,7 @@
                 </a14:hiddenLine>
               </a:ext>
               <a:ext uri="{AF507438-7753-43E0-B8FC-AC1667EBCBE1}">
-                <a14:hiddenEffects xmlns:a14="http://schemas.microsoft.com/office/drawing/2010/main" xmlns="">
+                <a14:hiddenEffects xmlns:a14="http://schemas.microsoft.com/office/drawing/2010/main">
                   <a:effectLst>
                     <a:outerShdw dist="35921" dir="2700000" algn="ctr" rotWithShape="0">
                       <a:schemeClr val="bg2"/>
@@ -3466,21 +3489,12 @@
           <a:p>
             <a:r>
               <a:rPr lang="en-GB" dirty="0" smtClean="0"/>
-              <a:t>Diamagnetism and the </a:t>
-            </a:r>
-            <a:r>
-              <a:rPr lang="en-GB" dirty="0" err="1" smtClean="0"/>
-              <a:t>Meissner</a:t>
-            </a:r>
-            <a:r>
-              <a:rPr lang="en-GB" dirty="0" smtClean="0"/>
-              <a:t> effect</a:t>
+              <a:t>Diamagnetism and the Meissner effect</a:t>
             </a:r>
             <a:r>
               <a:rPr lang="en-GB" sz="1400" dirty="0" smtClean="0"/>
               <a:t>: </a:t>
             </a:r>
-            <a:endParaRPr lang="en-GB" sz="1400" dirty="0" smtClean="0"/>
           </a:p>
           <a:p>
             <a:r>
@@ -3495,44 +3509,16 @@
             </a:r>
             <a:r>
               <a:rPr lang="en-GB" sz="1400" dirty="0" smtClean="0"/>
-              <a:t>When </a:t>
-            </a:r>
+              <a:t>When a current is induced in a material to oppose an applied magnetic field. These induced currents produce magnetisation in the material, again opposing the applied field.</a:t>
+            </a:r>
+          </a:p>
+          <a:p>
+            <a:endParaRPr lang="en-GB" sz="1400" dirty="0" smtClean="0"/>
+          </a:p>
+          <a:p>
             <a:r>
               <a:rPr lang="en-GB" sz="1400" dirty="0" smtClean="0"/>
-              <a:t>a current is induced in a material to oppose an applied magnetic field. These induced currents produce magnetisation in the material, again opposing the applied field</a:t>
-            </a:r>
-            <a:r>
-              <a:rPr lang="en-GB" sz="1400" dirty="0" smtClean="0"/>
-              <a:t>.</a:t>
-            </a:r>
-          </a:p>
-          <a:p>
-            <a:endParaRPr lang="en-GB" sz="1400" dirty="0" smtClean="0"/>
-          </a:p>
-          <a:p>
-            <a:r>
-              <a:rPr lang="en-GB" sz="1400" dirty="0" smtClean="0"/>
-              <a:t>Superconductors  have perfect diamagnetism, this is the </a:t>
-            </a:r>
-            <a:r>
-              <a:rPr lang="en-GB" sz="1400" dirty="0" err="1" smtClean="0"/>
-              <a:t>M</a:t>
-            </a:r>
-            <a:r>
-              <a:rPr lang="en-GB" sz="1400" dirty="0" err="1" smtClean="0"/>
-              <a:t>eissner</a:t>
-            </a:r>
-            <a:r>
-              <a:rPr lang="en-GB" sz="1400" dirty="0" smtClean="0"/>
-              <a:t> effect. All </a:t>
-            </a:r>
-            <a:r>
-              <a:rPr lang="en-GB" sz="1400" dirty="0" smtClean="0"/>
-              <a:t>internal fields are </a:t>
-            </a:r>
-            <a:r>
-              <a:rPr lang="en-GB" sz="1400" dirty="0" smtClean="0"/>
-              <a:t>expelled from the material by the induced currents.</a:t>
+              <a:t>Superconductors  have perfect diamagnetism, this is the Meissner effect. All internal fields are expelled from the material by the induced currents.</a:t>
             </a:r>
             <a:endParaRPr lang="en-GB" sz="1400" dirty="0"/>
           </a:p>
@@ -3570,10 +3556,171 @@
           </a:p>
         </p:txBody>
       </p:sp>
+      <p:pic>
+        <p:nvPicPr>
+          <p:cNvPr id="12" name="Picture 11" descr="\frac{\partial \mathbf{j}_s}{\partial t} = \frac{n_s e^2}{m}\mathbf{E}, \qquad \mathbf{\nabla}\times\mathbf{j}_s =-\frac{n_s e^2}{m c}\mathbf{B}. "/>
+          <p:cNvPicPr/>
+          <p:nvPr/>
+        </p:nvPicPr>
+        <p:blipFill>
+          <a:blip r:embed="rId3">
+            <a:extLst>
+              <a:ext uri="{28A0092B-C50C-407E-A947-70E740481C1C}">
+                <a14:useLocalDpi xmlns:a14="http://schemas.microsoft.com/office/drawing/2010/main" val="0"/>
+              </a:ext>
+            </a:extLst>
+          </a:blip>
+          <a:srcRect/>
+          <a:stretch>
+            <a:fillRect/>
+          </a:stretch>
+        </p:blipFill>
+        <p:spPr bwMode="auto">
+          <a:xfrm>
+            <a:off x="107504" y="3683915"/>
+            <a:ext cx="2981325" cy="419100"/>
+          </a:xfrm>
+          <a:prstGeom prst="rect">
+            <a:avLst/>
+          </a:prstGeom>
+          <a:noFill/>
+          <a:ln>
+            <a:noFill/>
+          </a:ln>
+        </p:spPr>
+      </p:pic>
+      <p:sp>
+        <p:nvSpPr>
+          <p:cNvPr id="4" name="TextBox 3"/>
+          <p:cNvSpPr txBox="1"/>
+          <p:nvPr/>
+        </p:nvSpPr>
+        <p:spPr>
+          <a:xfrm>
+            <a:off x="35496" y="4183238"/>
+            <a:ext cx="2808312" cy="2554545"/>
+          </a:xfrm>
+          <a:prstGeom prst="rect">
+            <a:avLst/>
+          </a:prstGeom>
+          <a:noFill/>
+        </p:spPr>
+        <p:txBody>
+          <a:bodyPr wrap="square" rtlCol="0">
+            <a:spAutoFit/>
+          </a:bodyPr>
+          <a:lstStyle/>
+          <a:p>
+            <a:r>
+              <a:rPr lang="en-GB" sz="1400" b="1" dirty="0" err="1" smtClean="0"/>
+              <a:t>j</a:t>
+            </a:r>
+            <a:r>
+              <a:rPr lang="en-GB" sz="1400" baseline="-25000" dirty="0" err="1" smtClean="0"/>
+              <a:t>s</a:t>
+            </a:r>
+            <a:r>
+              <a:rPr lang="en-GB" sz="1400" dirty="0" smtClean="0"/>
+              <a:t>: Superconducting current density</a:t>
+            </a:r>
+          </a:p>
+          <a:p>
+            <a:r>
+              <a:rPr lang="en-GB" sz="1400" b="1" dirty="0" smtClean="0"/>
+              <a:t>E</a:t>
+            </a:r>
+            <a:r>
+              <a:rPr lang="en-GB" sz="1400" dirty="0" smtClean="0"/>
+              <a:t>: Electric Field Strength</a:t>
+            </a:r>
+          </a:p>
+          <a:p>
+            <a:r>
+              <a:rPr lang="en-GB" sz="1400" b="1" dirty="0" smtClean="0"/>
+              <a:t>B</a:t>
+            </a:r>
+            <a:r>
+              <a:rPr lang="en-GB" sz="1400" dirty="0" smtClean="0"/>
+              <a:t>: Magnetic Field Strength</a:t>
+            </a:r>
+          </a:p>
+          <a:p>
+            <a:r>
+              <a:rPr lang="en-GB" sz="1400" dirty="0"/>
+              <a:t>e</a:t>
+            </a:r>
+            <a:r>
+              <a:rPr lang="en-GB" sz="1400" dirty="0" smtClean="0"/>
+              <a:t>: Elementary Charge</a:t>
+            </a:r>
+          </a:p>
+          <a:p>
+            <a:r>
+              <a:rPr lang="en-GB" sz="1400" dirty="0"/>
+              <a:t>m</a:t>
+            </a:r>
+            <a:r>
+              <a:rPr lang="en-GB" sz="1400" dirty="0" smtClean="0"/>
+              <a:t>: Electron Mass</a:t>
+            </a:r>
+          </a:p>
+          <a:p>
+            <a:r>
+              <a:rPr lang="en-GB" sz="1400" dirty="0"/>
+              <a:t>n</a:t>
+            </a:r>
+            <a:r>
+              <a:rPr lang="en-GB" sz="1400" baseline="-25000" dirty="0"/>
+              <a:t>s</a:t>
+            </a:r>
+            <a:r>
+              <a:rPr lang="en-GB" sz="1400" dirty="0"/>
+              <a:t>: phenomenological constant loosely associated with a number density of superconducting carriers</a:t>
+            </a:r>
+          </a:p>
+          <a:p>
+            <a:r>
+              <a:rPr lang="en-GB" sz="1400" dirty="0"/>
+              <a:t>∇ X </a:t>
+            </a:r>
+            <a:r>
+              <a:rPr lang="en-GB" sz="1400" dirty="0" err="1"/>
+              <a:t>j</a:t>
+            </a:r>
+            <a:r>
+              <a:rPr lang="en-GB" sz="1400" baseline="-25000" dirty="0" err="1"/>
+              <a:t>s</a:t>
+            </a:r>
+            <a:r>
+              <a:rPr lang="en-GB" sz="1400" dirty="0"/>
+              <a:t>: Curl </a:t>
+            </a:r>
+            <a:r>
+              <a:rPr lang="en-GB" sz="1400" dirty="0" err="1"/>
+              <a:t>j</a:t>
+            </a:r>
+            <a:r>
+              <a:rPr lang="en-GB" sz="1400" baseline="-25000" dirty="0" err="1"/>
+              <a:t>s</a:t>
+            </a:r>
+            <a:r>
+              <a:rPr lang="en-GB" sz="1400" baseline="-25000" dirty="0"/>
+              <a:t> </a:t>
+            </a:r>
+            <a:r>
+              <a:rPr lang="en-GB" sz="1400" dirty="0"/>
+              <a:t>(infinitesimal rotation of a 3-D vector field)</a:t>
+            </a:r>
+          </a:p>
+          <a:p>
+            <a:endParaRPr lang="en-GB" sz="2000" dirty="0"/>
+          </a:p>
+        </p:txBody>
+      </p:sp>
     </p:spTree>
     <p:extLst>
       <p:ext uri="{BB962C8B-B14F-4D97-AF65-F5344CB8AC3E}">
-        <p14:creationId xmlns:p14="http://schemas.microsoft.com/office/powerpoint/2010/main" xmlns="" val="830259126"/>
+        <p14:creationId xmlns:p14="http://schemas.microsoft.com/office/powerpoint/2010/main" val="830259126"/>
       </p:ext>
     </p:extLst>
   </p:cSld>

</xml_diff>